<commit_message>
- Báo cáo Luongnv.Intro4.0.pptx
</commit_message>
<xml_diff>
--- a/Presents/Luongnv.Intro3.0.pptx
+++ b/Presents/Luongnv.Intro3.0.pptx
@@ -269,7 +269,7 @@
           <a:p>
             <a:fld id="{25F1A227-23B6-4C19-942A-F47326EC29E8}" type="datetimeFigureOut">
               <a:rPr lang="en-US" smtClean="0"/>
-              <a:t>3/28/2012</a:t>
+              <a:t>3/31/2012</a:t>
             </a:fld>
             <a:endParaRPr lang="en-US"/>
           </a:p>
@@ -10354,7 +10354,7 @@
           <a:p>
             <a:fld id="{71052FE1-3B5B-4810-A49E-9809327C23B0}" type="datetime1">
               <a:rPr lang="en-US" smtClean="0"/>
-              <a:t>3/28/2012</a:t>
+              <a:t>3/31/2012</a:t>
             </a:fld>
             <a:endParaRPr lang="en-US"/>
           </a:p>
@@ -10528,7 +10528,7 @@
           <a:p>
             <a:fld id="{6508B24B-3736-46F1-A6CF-41C799FC1BF8}" type="datetime1">
               <a:rPr lang="en-US" smtClean="0"/>
-              <a:t>3/28/2012</a:t>
+              <a:t>3/31/2012</a:t>
             </a:fld>
             <a:endParaRPr lang="en-US"/>
           </a:p>
@@ -10712,7 +10712,7 @@
           <a:p>
             <a:fld id="{737D6933-6F8D-476F-B929-CFD95D14D3FE}" type="datetime1">
               <a:rPr lang="en-US" smtClean="0"/>
-              <a:t>3/28/2012</a:t>
+              <a:t>3/31/2012</a:t>
             </a:fld>
             <a:endParaRPr lang="en-US"/>
           </a:p>
@@ -10892,7 +10892,7 @@
           <a:p>
             <a:fld id="{E3E2306C-E34F-4492-8C03-BFD178B0B86F}" type="datetime1">
               <a:rPr lang="en-US" smtClean="0"/>
-              <a:t>3/28/2012</a:t>
+              <a:t>3/31/2012</a:t>
             </a:fld>
             <a:endParaRPr lang="en-US"/>
           </a:p>
@@ -11142,7 +11142,7 @@
           <a:p>
             <a:fld id="{F45CE621-976D-490D-93D6-82BE04FEF33C}" type="datetime1">
               <a:rPr lang="en-US" smtClean="0"/>
-              <a:t>3/28/2012</a:t>
+              <a:t>3/31/2012</a:t>
             </a:fld>
             <a:endParaRPr lang="en-US"/>
           </a:p>
@@ -11434,7 +11434,7 @@
           <a:p>
             <a:fld id="{24C18882-06AD-4971-A70B-932A9A310951}" type="datetime1">
               <a:rPr lang="en-US" smtClean="0"/>
-              <a:t>3/28/2012</a:t>
+              <a:t>3/31/2012</a:t>
             </a:fld>
             <a:endParaRPr lang="en-US"/>
           </a:p>
@@ -11860,7 +11860,7 @@
           <a:p>
             <a:fld id="{40FDA9CF-AA6A-4460-BD3C-E233BABB6924}" type="datetime1">
               <a:rPr lang="en-US" smtClean="0"/>
-              <a:t>3/28/2012</a:t>
+              <a:t>3/31/2012</a:t>
             </a:fld>
             <a:endParaRPr lang="en-US"/>
           </a:p>
@@ -11982,7 +11982,7 @@
           <a:p>
             <a:fld id="{D9D502B8-AD58-4FD1-B793-29B56CAC21BC}" type="datetime1">
               <a:rPr lang="en-US" smtClean="0"/>
-              <a:t>3/28/2012</a:t>
+              <a:t>3/31/2012</a:t>
             </a:fld>
             <a:endParaRPr lang="en-US"/>
           </a:p>
@@ -12081,7 +12081,7 @@
           <a:p>
             <a:fld id="{B92BDB8E-050F-425D-9DE1-477C1D76FE38}" type="datetime1">
               <a:rPr lang="en-US" smtClean="0"/>
-              <a:t>3/28/2012</a:t>
+              <a:t>3/31/2012</a:t>
             </a:fld>
             <a:endParaRPr lang="en-US"/>
           </a:p>
@@ -12362,7 +12362,7 @@
           <a:p>
             <a:fld id="{4DCF948D-9A0F-45A7-AC2A-0F9D66411295}" type="datetime1">
               <a:rPr lang="en-US" smtClean="0"/>
-              <a:t>3/28/2012</a:t>
+              <a:t>3/31/2012</a:t>
             </a:fld>
             <a:endParaRPr lang="en-US"/>
           </a:p>
@@ -12619,7 +12619,7 @@
           <a:p>
             <a:fld id="{4A21D891-95FB-4F5F-ADE7-5BBBBA77FC22}" type="datetime1">
               <a:rPr lang="en-US" smtClean="0"/>
-              <a:t>3/28/2012</a:t>
+              <a:t>3/31/2012</a:t>
             </a:fld>
             <a:endParaRPr lang="en-US"/>
           </a:p>
@@ -12836,7 +12836,7 @@
           <a:p>
             <a:fld id="{52F776B0-53FF-4CEF-B324-E68B4BDDBC71}" type="datetime1">
               <a:rPr lang="en-US" smtClean="0"/>
-              <a:t>3/28/2012</a:t>
+              <a:t>3/31/2012</a:t>
             </a:fld>
             <a:endParaRPr lang="en-US"/>
           </a:p>
@@ -13223,26 +13223,92 @@
             <a:spLocks noGrp="1"/>
           </p:cNvSpPr>
           <p:nvPr>
-            <p:ph type="title"/>
+            <p:ph type="ctrTitle"/>
+          </p:nvPr>
+        </p:nvSpPr>
+        <p:spPr/>
+        <p:txBody>
+          <a:bodyPr>
+            <a:noAutofit/>
+          </a:bodyPr>
+          <a:lstStyle/>
+          <a:p>
+            <a:r>
+              <a:rPr lang="en-US" sz="3600" b="1" dirty="0" smtClean="0"/>
+              <a:t>ÁP DỤNG GIẢI THUẬT DI TRUYỀN GIẢI BÀI TOÁN THIẾT KẾ MẠNG CHỊU LỖI MÔ HÌNH ĐA TẦNG</a:t>
+            </a:r>
+            <a:endParaRPr lang="en-US" sz="3600" b="1" dirty="0"/>
+          </a:p>
+        </p:txBody>
+      </p:sp>
+      <p:sp>
+        <p:nvSpPr>
+          <p:cNvPr id="3" name="Subtitle 2"/>
+          <p:cNvSpPr>
+            <a:spLocks noGrp="1"/>
+          </p:cNvSpPr>
+          <p:nvPr>
+            <p:ph type="subTitle" idx="1"/>
           </p:nvPr>
         </p:nvSpPr>
         <p:spPr>
           <a:xfrm>
-            <a:off x="609600" y="2667000"/>
-            <a:ext cx="8229600" cy="1143000"/>
+            <a:off x="4495800" y="4495800"/>
+            <a:ext cx="3962400" cy="990600"/>
           </a:xfrm>
         </p:spPr>
         <p:txBody>
           <a:bodyPr>
-            <a:normAutofit fontScale="90000"/>
+            <a:normAutofit/>
           </a:bodyPr>
           <a:lstStyle/>
           <a:p>
-            <a:r>
-              <a:rPr lang="en-US" b="1" dirty="0" smtClean="0"/>
-              <a:t>SURVIVALBE NETWORK DESIGN</a:t>
-            </a:r>
-            <a:endParaRPr lang="en-US" b="1" dirty="0"/>
+            <a:pPr algn="l"/>
+            <a:r>
+              <a:rPr lang="en-US" sz="2400" dirty="0" smtClean="0"/>
+              <a:t>Presenter: Nguyễn Văn </a:t>
+            </a:r>
+            <a:r>
+              <a:rPr lang="en-US" sz="2400" dirty="0" err="1" smtClean="0"/>
+              <a:t>Lương</a:t>
+            </a:r>
+            <a:endParaRPr lang="en-US" sz="2400" dirty="0" smtClean="0"/>
+          </a:p>
+          <a:p>
+            <a:pPr algn="l"/>
+            <a:r>
+              <a:rPr lang="en-US" sz="2400" dirty="0" err="1" smtClean="0"/>
+              <a:t>Khoa</a:t>
+            </a:r>
+            <a:r>
+              <a:rPr lang="en-US" sz="2400" dirty="0" smtClean="0"/>
+              <a:t> </a:t>
+            </a:r>
+            <a:r>
+              <a:rPr lang="en-US" sz="2400" dirty="0" err="1" smtClean="0"/>
+              <a:t>học</a:t>
+            </a:r>
+            <a:r>
+              <a:rPr lang="en-US" sz="2400" dirty="0" smtClean="0"/>
+              <a:t> </a:t>
+            </a:r>
+            <a:r>
+              <a:rPr lang="en-US" sz="2400" dirty="0" err="1" smtClean="0"/>
+              <a:t>máy</a:t>
+            </a:r>
+            <a:r>
+              <a:rPr lang="en-US" sz="2400" dirty="0" smtClean="0"/>
+              <a:t> </a:t>
+            </a:r>
+            <a:r>
+              <a:rPr lang="en-US" sz="2400" dirty="0" err="1" smtClean="0"/>
+              <a:t>tính</a:t>
+            </a:r>
+            <a:r>
+              <a:rPr lang="en-US" sz="2400" dirty="0" smtClean="0"/>
+              <a:t> – K52</a:t>
+            </a:r>
+            <a:endParaRPr lang="en-US" sz="2400" dirty="0"/>
           </a:p>
         </p:txBody>
       </p:sp>
@@ -13263,7 +13329,7 @@
           <a:p>
             <a:fld id="{76501CD9-90AD-4FB7-A953-0FB9DCCFDF2E}" type="datetime1">
               <a:rPr lang="en-US" smtClean="0"/>
-              <a:t>3/28/2012</a:t>
+              <a:t>3/31/2012</a:t>
             </a:fld>
             <a:endParaRPr lang="en-US"/>
           </a:p>
@@ -13467,7 +13533,7 @@
           <a:p>
             <a:fld id="{D9D502B8-AD58-4FD1-B793-29B56CAC21BC}" type="datetime1">
               <a:rPr lang="en-US" smtClean="0"/>
-              <a:t>3/28/2012</a:t>
+              <a:t>3/31/2012</a:t>
             </a:fld>
             <a:endParaRPr lang="en-US"/>
           </a:p>
@@ -13733,7 +13799,7 @@
           <a:p>
             <a:fld id="{D9D502B8-AD58-4FD1-B793-29B56CAC21BC}" type="datetime1">
               <a:rPr lang="en-US" smtClean="0"/>
-              <a:t>3/28/2012</a:t>
+              <a:t>3/31/2012</a:t>
             </a:fld>
             <a:endParaRPr lang="en-US"/>
           </a:p>
@@ -13889,7 +13955,7 @@
           <a:p>
             <a:fld id="{D9D502B8-AD58-4FD1-B793-29B56CAC21BC}" type="datetime1">
               <a:rPr lang="en-US" smtClean="0"/>
-              <a:t>3/28/2012</a:t>
+              <a:t>3/31/2012</a:t>
             </a:fld>
             <a:endParaRPr lang="en-US"/>
           </a:p>
@@ -14129,7 +14195,7 @@
           <a:p>
             <a:fld id="{D9D502B8-AD58-4FD1-B793-29B56CAC21BC}" type="datetime1">
               <a:rPr lang="en-US" smtClean="0"/>
-              <a:t>3/28/2012</a:t>
+              <a:t>3/31/2012</a:t>
             </a:fld>
             <a:endParaRPr lang="en-US"/>
           </a:p>
@@ -14837,7 +14903,7 @@
           <a:p>
             <a:fld id="{D9D502B8-AD58-4FD1-B793-29B56CAC21BC}" type="datetime1">
               <a:rPr lang="en-US" smtClean="0"/>
-              <a:t>3/28/2012</a:t>
+              <a:t>3/31/2012</a:t>
             </a:fld>
             <a:endParaRPr lang="en-US"/>
           </a:p>
@@ -15402,7 +15468,7 @@
           <a:p>
             <a:fld id="{D9D502B8-AD58-4FD1-B793-29B56CAC21BC}" type="datetime1">
               <a:rPr lang="en-US" smtClean="0"/>
-              <a:t>3/28/2012</a:t>
+              <a:t>3/31/2012</a:t>
             </a:fld>
             <a:endParaRPr lang="en-US"/>
           </a:p>
@@ -15855,7 +15921,7 @@
           <a:p>
             <a:fld id="{D9D502B8-AD58-4FD1-B793-29B56CAC21BC}" type="datetime1">
               <a:rPr lang="en-US" smtClean="0"/>
-              <a:t>3/28/2012</a:t>
+              <a:t>3/31/2012</a:t>
             </a:fld>
             <a:endParaRPr lang="en-US"/>
           </a:p>
@@ -15984,7 +16050,7 @@
           <a:p>
             <a:fld id="{D9D502B8-AD58-4FD1-B793-29B56CAC21BC}" type="datetime1">
               <a:rPr lang="en-US" smtClean="0"/>
-              <a:t>3/28/2012</a:t>
+              <a:t>3/31/2012</a:t>
             </a:fld>
             <a:endParaRPr lang="en-US"/>
           </a:p>
@@ -16252,7 +16318,7 @@
           <a:p>
             <a:fld id="{D9D502B8-AD58-4FD1-B793-29B56CAC21BC}" type="datetime1">
               <a:rPr lang="en-US" smtClean="0"/>
-              <a:t>3/28/2012</a:t>
+              <a:t>3/31/2012</a:t>
             </a:fld>
             <a:endParaRPr lang="en-US"/>
           </a:p>
@@ -16340,7 +16406,7 @@
               <a:t>mạng</a:t>
             </a:r>
             <a:r>
-              <a:rPr lang="en-US" smtClean="0"/>
+              <a:rPr lang="en-US" dirty="0" smtClean="0"/>
               <a:t>:</a:t>
             </a:r>
             <a:endParaRPr lang="en-US" dirty="0"/>
@@ -16685,7 +16751,7 @@
           <a:p>
             <a:fld id="{D9D502B8-AD58-4FD1-B793-29B56CAC21BC}" type="datetime1">
               <a:rPr lang="en-US" smtClean="0"/>
-              <a:t>3/28/2012</a:t>
+              <a:t>3/31/2012</a:t>
             </a:fld>
             <a:endParaRPr lang="en-US"/>
           </a:p>
@@ -16981,7 +17047,7 @@
           <a:p>
             <a:fld id="{D9D502B8-AD58-4FD1-B793-29B56CAC21BC}" type="datetime1">
               <a:rPr lang="en-US" smtClean="0"/>
-              <a:t>3/28/2012</a:t>
+              <a:t>3/31/2012</a:t>
             </a:fld>
             <a:endParaRPr lang="en-US"/>
           </a:p>
@@ -17521,8 +17587,12 @@
           <a:p>
             <a:pPr lvl="1"/>
             <a:r>
-              <a:rPr lang="en-US" dirty="0" err="1" smtClean="0"/>
-              <a:t>Đường</a:t>
+              <a:rPr lang="en-US" dirty="0" smtClean="0"/>
+              <a:t>2 </a:t>
+            </a:r>
+            <a:r>
+              <a:rPr lang="en-US" dirty="0" err="1" smtClean="0"/>
+              <a:t>đường</a:t>
             </a:r>
             <a:r>
               <a:rPr lang="en-US" dirty="0" smtClean="0"/>
@@ -17539,6 +17609,38 @@
             <a:r>
               <a:rPr lang="en-US" dirty="0" err="1" smtClean="0"/>
               <a:t>cho</a:t>
+            </a:r>
+            <a:r>
+              <a:rPr lang="en-US" dirty="0" smtClean="0"/>
+              <a:t> </a:t>
+            </a:r>
+            <a:r>
+              <a:rPr lang="en-US" dirty="0" err="1" smtClean="0"/>
+              <a:t>mỗi</a:t>
+            </a:r>
+            <a:r>
+              <a:rPr lang="en-US" dirty="0" smtClean="0"/>
+              <a:t> </a:t>
+            </a:r>
+            <a:r>
+              <a:rPr lang="en-US" dirty="0" err="1" smtClean="0"/>
+              <a:t>yêu</a:t>
+            </a:r>
+            <a:r>
+              <a:rPr lang="en-US" dirty="0" smtClean="0"/>
+              <a:t> </a:t>
+            </a:r>
+            <a:r>
+              <a:rPr lang="en-US" dirty="0" err="1" smtClean="0"/>
+              <a:t>cầu</a:t>
+            </a:r>
+            <a:r>
+              <a:rPr lang="en-US" dirty="0" smtClean="0"/>
+              <a:t> </a:t>
+            </a:r>
+            <a:r>
+              <a:rPr lang="en-US" dirty="0" err="1" smtClean="0"/>
+              <a:t>trong</a:t>
             </a:r>
             <a:r>
               <a:rPr lang="en-US" dirty="0" smtClean="0"/>
@@ -17660,7 +17762,7 @@
           <a:p>
             <a:fld id="{D9D502B8-AD58-4FD1-B793-29B56CAC21BC}" type="datetime1">
               <a:rPr lang="en-US" smtClean="0"/>
-              <a:t>3/28/2012</a:t>
+              <a:t>3/31/2012</a:t>
             </a:fld>
             <a:endParaRPr lang="en-US"/>
           </a:p>
@@ -17766,8 +17868,8 @@
           <a:p>
             <a:pPr algn="l"/>
             <a:r>
-              <a:rPr lang="en-US" b="1" dirty="0" smtClean="0"/>
-              <a:t>RELATED WORK</a:t>
+              <a:rPr lang="en-US" dirty="0" smtClean="0"/>
+              <a:t>CÁC NGHIÊN CỨU LIÊN QUAN</a:t>
             </a:r>
             <a:endParaRPr lang="en-US" b="1" dirty="0"/>
           </a:p>
@@ -17786,14 +17888,19 @@
         <p:spPr/>
         <p:txBody>
           <a:bodyPr>
-            <a:normAutofit fontScale="92500" lnSpcReduction="10000"/>
+            <a:normAutofit/>
           </a:bodyPr>
           <a:lstStyle/>
           <a:p>
             <a:r>
               <a:rPr lang="en-US" dirty="0" smtClean="0"/>
-              <a:t>Survivable Mapping Algorithm by Ring Trimming ( SMART ) for large IP-over- WDM networks</a:t>
-            </a:r>
+              <a:t>SMART: </a:t>
+            </a:r>
+            <a:r>
+              <a:rPr lang="en-US" dirty="0" err="1" smtClean="0"/>
+              <a:t>TungDT</a:t>
+            </a:r>
+            <a:endParaRPr lang="en-US" dirty="0" smtClean="0"/>
           </a:p>
           <a:p>
             <a:r>
@@ -17919,7 +18026,7 @@
           <a:p>
             <a:fld id="{D9D502B8-AD58-4FD1-B793-29B56CAC21BC}" type="datetime1">
               <a:rPr lang="en-US" smtClean="0"/>
-              <a:t>3/28/2012</a:t>
+              <a:t>3/31/2012</a:t>
             </a:fld>
             <a:endParaRPr lang="en-US"/>
           </a:p>
@@ -18268,7 +18375,7 @@
           <a:p>
             <a:fld id="{D9D502B8-AD58-4FD1-B793-29B56CAC21BC}" type="datetime1">
               <a:rPr lang="en-US" smtClean="0"/>
-              <a:t>3/28/2012</a:t>
+              <a:t>3/31/2012</a:t>
             </a:fld>
             <a:endParaRPr lang="en-US"/>
           </a:p>
@@ -18595,7 +18702,7 @@
           <a:p>
             <a:fld id="{D9D502B8-AD58-4FD1-B793-29B56CAC21BC}" type="datetime1">
               <a:rPr lang="en-US" smtClean="0"/>
-              <a:t>3/28/2012</a:t>
+              <a:t>3/31/2012</a:t>
             </a:fld>
             <a:endParaRPr lang="en-US"/>
           </a:p>
@@ -18731,7 +18838,7 @@
           <a:p>
             <a:fld id="{E3E2306C-E34F-4492-8C03-BFD178B0B86F}" type="datetime1">
               <a:rPr lang="en-US" smtClean="0"/>
-              <a:t>3/28/2012</a:t>
+              <a:t>3/31/2012</a:t>
             </a:fld>
             <a:endParaRPr lang="en-US"/>
           </a:p>
@@ -19042,7 +19149,7 @@
           <a:p>
             <a:fld id="{E3E2306C-E34F-4492-8C03-BFD178B0B86F}" type="datetime1">
               <a:rPr lang="en-US" smtClean="0"/>
-              <a:t>3/28/2012</a:t>
+              <a:t>3/31/2012</a:t>
             </a:fld>
             <a:endParaRPr lang="en-US"/>
           </a:p>
@@ -19258,7 +19365,7 @@
           <a:p>
             <a:fld id="{D9D502B8-AD58-4FD1-B793-29B56CAC21BC}" type="datetime1">
               <a:rPr lang="en-US" smtClean="0"/>
-              <a:t>3/28/2012</a:t>
+              <a:t>3/31/2012</a:t>
             </a:fld>
             <a:endParaRPr lang="en-US"/>
           </a:p>
@@ -19514,7 +19621,7 @@
           <a:p>
             <a:fld id="{D9D502B8-AD58-4FD1-B793-29B56CAC21BC}" type="datetime1">
               <a:rPr lang="en-US" smtClean="0"/>
-              <a:t>3/28/2012</a:t>
+              <a:t>3/31/2012</a:t>
             </a:fld>
             <a:endParaRPr lang="en-US"/>
           </a:p>
@@ -19826,7 +19933,7 @@
           <a:p>
             <a:fld id="{D9D502B8-AD58-4FD1-B793-29B56CAC21BC}" type="datetime1">
               <a:rPr lang="en-US" smtClean="0"/>
-              <a:t>3/28/2012</a:t>
+              <a:t>3/31/2012</a:t>
             </a:fld>
             <a:endParaRPr lang="en-US"/>
           </a:p>
@@ -20095,7 +20202,7 @@
           <a:p>
             <a:fld id="{D9D502B8-AD58-4FD1-B793-29B56CAC21BC}" type="datetime1">
               <a:rPr lang="en-US" smtClean="0"/>
-              <a:t>3/28/2012</a:t>
+              <a:t>3/31/2012</a:t>
             </a:fld>
             <a:endParaRPr lang="en-US"/>
           </a:p>
@@ -20359,7 +20466,7 @@
           <a:p>
             <a:fld id="{D9D502B8-AD58-4FD1-B793-29B56CAC21BC}" type="datetime1">
               <a:rPr lang="en-US" smtClean="0"/>
-              <a:t>3/28/2012</a:t>
+              <a:t>3/31/2012</a:t>
             </a:fld>
             <a:endParaRPr lang="en-US"/>
           </a:p>
@@ -20603,7 +20710,7 @@
           <a:p>
             <a:fld id="{D9D502B8-AD58-4FD1-B793-29B56CAC21BC}" type="datetime1">
               <a:rPr lang="en-US" smtClean="0"/>
-              <a:t>3/28/2012</a:t>
+              <a:t>3/31/2012</a:t>
             </a:fld>
             <a:endParaRPr lang="en-US"/>
           </a:p>

</xml_diff>